<commit_message>
* Added new intro presentation * Changed some wording in HTML presentation
</commit_message>
<xml_diff>
--- a/Präsentationen/HTML.pptx
+++ b/Präsentationen/HTML.pptx
@@ -260,7 +260,7 @@
           <a:p>
             <a:fld id="{FD48EB67-2BC6-40D7-89DF-0F485185C702}" type="datetimeFigureOut">
               <a:rPr lang="de-CH" smtClean="0"/>
-              <a:t>08.04.2015</a:t>
+              <a:t>01.02.2016</a:t>
             </a:fld>
             <a:endParaRPr lang="de-CH"/>
           </a:p>
@@ -750,11 +750,7 @@
           <a:p>
             <a:r>
               <a:rPr lang="de-CH" dirty="0" smtClean="0"/>
-              <a:t>Aufgabe: Wikipedia Artikel im HTML </a:t>
-            </a:r>
-            <a:r>
-              <a:rPr lang="de-CH" dirty="0" smtClean="0"/>
-              <a:t>aufbereiten</a:t>
+              <a:t>Aufgabe: Wikipedia Artikel im HTML aufbereiten</a:t>
             </a:r>
           </a:p>
           <a:p>
@@ -1654,7 +1650,7 @@
           <a:p>
             <a:fld id="{2C314328-1F4E-4134-AA27-A85D42511787}" type="datetimeFigureOut">
               <a:rPr lang="de-CH" smtClean="0"/>
-              <a:t>08.04.2015</a:t>
+              <a:t>01.02.2016</a:t>
             </a:fld>
             <a:endParaRPr lang="de-CH"/>
           </a:p>
@@ -1862,7 +1858,7 @@
           <a:p>
             <a:fld id="{2C314328-1F4E-4134-AA27-A85D42511787}" type="datetimeFigureOut">
               <a:rPr lang="de-CH" smtClean="0"/>
-              <a:t>08.04.2015</a:t>
+              <a:t>01.02.2016</a:t>
             </a:fld>
             <a:endParaRPr lang="de-CH"/>
           </a:p>
@@ -2118,7 +2114,7 @@
           <a:p>
             <a:fld id="{2C314328-1F4E-4134-AA27-A85D42511787}" type="datetimeFigureOut">
               <a:rPr lang="de-CH" smtClean="0"/>
-              <a:t>08.04.2015</a:t>
+              <a:t>01.02.2016</a:t>
             </a:fld>
             <a:endParaRPr lang="de-CH"/>
           </a:p>
@@ -2292,7 +2288,7 @@
           <a:p>
             <a:fld id="{2C314328-1F4E-4134-AA27-A85D42511787}" type="datetimeFigureOut">
               <a:rPr lang="de-CH" smtClean="0"/>
-              <a:t>08.04.2015</a:t>
+              <a:t>01.02.2016</a:t>
             </a:fld>
             <a:endParaRPr lang="de-CH"/>
           </a:p>
@@ -2635,7 +2631,7 @@
           <a:p>
             <a:fld id="{2C314328-1F4E-4134-AA27-A85D42511787}" type="datetimeFigureOut">
               <a:rPr lang="de-CH" smtClean="0"/>
-              <a:t>08.04.2015</a:t>
+              <a:t>01.02.2016</a:t>
             </a:fld>
             <a:endParaRPr lang="de-CH"/>
           </a:p>
@@ -2910,7 +2906,7 @@
           <a:p>
             <a:fld id="{2C314328-1F4E-4134-AA27-A85D42511787}" type="datetimeFigureOut">
               <a:rPr lang="de-CH" smtClean="0"/>
-              <a:t>08.04.2015</a:t>
+              <a:t>01.02.2016</a:t>
             </a:fld>
             <a:endParaRPr lang="de-CH"/>
           </a:p>
@@ -3289,7 +3285,7 @@
           <a:p>
             <a:fld id="{2C314328-1F4E-4134-AA27-A85D42511787}" type="datetimeFigureOut">
               <a:rPr lang="de-CH" smtClean="0"/>
-              <a:t>08.04.2015</a:t>
+              <a:t>01.02.2016</a:t>
             </a:fld>
             <a:endParaRPr lang="de-CH"/>
           </a:p>
@@ -3407,7 +3403,7 @@
           <a:p>
             <a:fld id="{2C314328-1F4E-4134-AA27-A85D42511787}" type="datetimeFigureOut">
               <a:rPr lang="de-CH" smtClean="0"/>
-              <a:t>08.04.2015</a:t>
+              <a:t>01.02.2016</a:t>
             </a:fld>
             <a:endParaRPr lang="de-CH"/>
           </a:p>
@@ -3578,7 +3574,7 @@
           <a:p>
             <a:fld id="{2C314328-1F4E-4134-AA27-A85D42511787}" type="datetimeFigureOut">
               <a:rPr lang="de-CH" smtClean="0"/>
-              <a:t>08.04.2015</a:t>
+              <a:t>01.02.2016</a:t>
             </a:fld>
             <a:endParaRPr lang="de-CH"/>
           </a:p>
@@ -3932,7 +3928,7 @@
           <a:p>
             <a:fld id="{2C314328-1F4E-4134-AA27-A85D42511787}" type="datetimeFigureOut">
               <a:rPr lang="de-CH" smtClean="0"/>
-              <a:t>08.04.2015</a:t>
+              <a:t>01.02.2016</a:t>
             </a:fld>
             <a:endParaRPr lang="de-CH"/>
           </a:p>
@@ -4314,7 +4310,7 @@
           <a:p>
             <a:fld id="{2C314328-1F4E-4134-AA27-A85D42511787}" type="datetimeFigureOut">
               <a:rPr lang="de-CH" smtClean="0"/>
-              <a:t>08.04.2015</a:t>
+              <a:t>01.02.2016</a:t>
             </a:fld>
             <a:endParaRPr lang="de-CH"/>
           </a:p>
@@ -4601,7 +4597,7 @@
           <a:p>
             <a:fld id="{2C314328-1F4E-4134-AA27-A85D42511787}" type="datetimeFigureOut">
               <a:rPr lang="de-CH" smtClean="0"/>
-              <a:t>08.04.2015</a:t>
+              <a:t>01.02.2016</a:t>
             </a:fld>
             <a:endParaRPr lang="de-CH"/>
           </a:p>
@@ -6905,7 +6901,7 @@
         <p:spPr>
           <a:xfrm>
             <a:off x="605481" y="3493570"/>
-            <a:ext cx="1975793" cy="646331"/>
+            <a:ext cx="1264883" cy="369332"/>
           </a:xfrm>
           <a:prstGeom prst="rect">
             <a:avLst/>
@@ -6929,9 +6925,7 @@
               <a:rPr lang="de-CH" dirty="0" smtClean="0"/>
               <a:t>Tag-Name</a:t>
             </a:r>
-          </a:p>
-          <a:p>
-            <a:endParaRPr lang="de-CH" dirty="0"/>
+            <a:endParaRPr lang="de-CH" dirty="0" smtClean="0"/>
           </a:p>
         </p:txBody>
       </p:sp>
@@ -6945,7 +6939,7 @@
         </p:nvCxnSpPr>
         <p:spPr>
           <a:xfrm flipH="1" flipV="1">
-            <a:off x="4756577" y="2449813"/>
+            <a:off x="4084151" y="2336349"/>
             <a:ext cx="266830" cy="935938"/>
           </a:xfrm>
           <a:prstGeom prst="straightConnector1">
@@ -6978,8 +6972,8 @@
         </p:nvSpPr>
         <p:spPr>
           <a:xfrm>
-            <a:off x="3674076" y="3493570"/>
-            <a:ext cx="3319848" cy="1200329"/>
+            <a:off x="3224573" y="3487482"/>
+            <a:ext cx="3319848" cy="923330"/>
           </a:xfrm>
           <a:prstGeom prst="rect">
             <a:avLst/>
@@ -7018,11 +7012,13 @@
           <a:p>
             <a:r>
               <a:rPr lang="de-CH" dirty="0" smtClean="0"/>
-              <a:t>Reichert den XML-Tag mit zusätzlichen Informationen an</a:t>
-            </a:r>
-          </a:p>
-          <a:p>
-            <a:endParaRPr lang="de-CH" dirty="0"/>
+              <a:t>Reichert den XML-Tag mit zusätzlichen Informationen </a:t>
+            </a:r>
+            <a:r>
+              <a:rPr lang="de-CH" dirty="0" smtClean="0"/>
+              <a:t>an</a:t>
+            </a:r>
+            <a:endParaRPr lang="de-CH" dirty="0" smtClean="0"/>
           </a:p>
         </p:txBody>
       </p:sp>
@@ -7036,8 +7032,8 @@
         </p:nvCxnSpPr>
         <p:spPr>
           <a:xfrm flipV="1">
-            <a:off x="5535827" y="2407614"/>
-            <a:ext cx="560173" cy="978137"/>
+            <a:off x="4750761" y="2263140"/>
+            <a:ext cx="211937" cy="1051347"/>
           </a:xfrm>
           <a:prstGeom prst="straightConnector1">
             <a:avLst/>
@@ -7071,8 +7067,8 @@
         </p:nvCxnSpPr>
         <p:spPr>
           <a:xfrm flipH="1" flipV="1">
-            <a:off x="7326630" y="2263140"/>
-            <a:ext cx="1856335" cy="1279477"/>
+            <a:off x="7326631" y="2263141"/>
+            <a:ext cx="3055965" cy="1224341"/>
           </a:xfrm>
           <a:prstGeom prst="straightConnector1">
             <a:avLst/>
@@ -7104,8 +7100,8 @@
         </p:nvSpPr>
         <p:spPr>
           <a:xfrm>
-            <a:off x="8197772" y="3816735"/>
-            <a:ext cx="1975793" cy="646331"/>
+            <a:off x="9965174" y="3542780"/>
+            <a:ext cx="1324603" cy="369332"/>
           </a:xfrm>
           <a:prstGeom prst="rect">
             <a:avLst/>
@@ -7125,16 +7121,88 @@
           </a:bodyPr>
           <a:lstStyle/>
           <a:p>
+            <a:pPr algn="r"/>
             <a:r>
               <a:rPr lang="de-CH" dirty="0" smtClean="0"/>
               <a:t>End-Tag</a:t>
             </a:r>
-          </a:p>
-          <a:p>
-            <a:endParaRPr lang="de-CH" dirty="0"/>
+            <a:endParaRPr lang="de-CH" dirty="0" smtClean="0"/>
           </a:p>
         </p:txBody>
       </p:sp>
+      <p:sp>
+        <p:nvSpPr>
+          <p:cNvPr id="13" name="Textfeld 12"/>
+          <p:cNvSpPr txBox="1"/>
+          <p:nvPr/>
+        </p:nvSpPr>
+        <p:spPr>
+          <a:xfrm>
+            <a:off x="7233371" y="3542779"/>
+            <a:ext cx="1330518" cy="369332"/>
+          </a:xfrm>
+          <a:prstGeom prst="rect">
+            <a:avLst/>
+          </a:prstGeom>
+          <a:solidFill>
+            <a:srgbClr val="0070C0">
+              <a:alpha val="21000"/>
+            </a:srgbClr>
+          </a:solidFill>
+          <a:ln>
+            <a:noFill/>
+          </a:ln>
+        </p:spPr>
+        <p:txBody>
+          <a:bodyPr wrap="square" rtlCol="0">
+            <a:spAutoFit/>
+          </a:bodyPr>
+          <a:lstStyle/>
+          <a:p>
+            <a:pPr algn="ctr"/>
+            <a:r>
+              <a:rPr lang="de-CH" dirty="0" smtClean="0"/>
+              <a:t>Wert</a:t>
+            </a:r>
+            <a:endParaRPr lang="de-CH" dirty="0" smtClean="0"/>
+          </a:p>
+        </p:txBody>
+      </p:sp>
+      <p:cxnSp>
+        <p:nvCxnSpPr>
+          <p:cNvPr id="14" name="Gerade Verbindung mit Pfeil 13"/>
+          <p:cNvCxnSpPr>
+            <a:cxnSpLocks/>
+          </p:cNvCxnSpPr>
+          <p:nvPr/>
+        </p:nvCxnSpPr>
+        <p:spPr>
+          <a:xfrm flipH="1" flipV="1">
+            <a:off x="5960225" y="2263140"/>
+            <a:ext cx="1745673" cy="1224343"/>
+          </a:xfrm>
+          <a:prstGeom prst="straightConnector1">
+            <a:avLst/>
+          </a:prstGeom>
+          <a:ln w="63500">
+            <a:tailEnd type="triangle"/>
+          </a:ln>
+        </p:spPr>
+        <p:style>
+          <a:lnRef idx="1">
+            <a:schemeClr val="dk1"/>
+          </a:lnRef>
+          <a:fillRef idx="0">
+            <a:schemeClr val="dk1"/>
+          </a:fillRef>
+          <a:effectRef idx="0">
+            <a:schemeClr val="dk1"/>
+          </a:effectRef>
+          <a:fontRef idx="minor">
+            <a:schemeClr val="tx1"/>
+          </a:fontRef>
+        </p:style>
+      </p:cxnSp>
     </p:spTree>
     <p:extLst>
       <p:ext uri="{BB962C8B-B14F-4D97-AF65-F5344CB8AC3E}">
@@ -7350,7 +7418,7 @@
                                           </p:stCondLst>
                                         </p:cTn>
                                         <p:tgtEl>
-                                          <p:spTgt spid="12"/>
+                                          <p:spTgt spid="13"/>
                                         </p:tgtEl>
                                         <p:attrNameLst>
                                           <p:attrName>style.visibility</p:attrName>
@@ -7372,6 +7440,78 @@
                                     <p:set>
                                       <p:cBhvr>
                                         <p:cTn id="22" dur="1" fill="hold">
+                                          <p:stCondLst>
+                                            <p:cond delay="0"/>
+                                          </p:stCondLst>
+                                        </p:cTn>
+                                        <p:tgtEl>
+                                          <p:spTgt spid="14"/>
+                                        </p:tgtEl>
+                                        <p:attrNameLst>
+                                          <p:attrName>style.visibility</p:attrName>
+                                        </p:attrNameLst>
+                                      </p:cBhvr>
+                                      <p:to>
+                                        <p:strVal val="visible"/>
+                                      </p:to>
+                                    </p:set>
+                                  </p:childTnLst>
+                                </p:cTn>
+                              </p:par>
+                            </p:childTnLst>
+                          </p:cTn>
+                        </p:par>
+                      </p:childTnLst>
+                    </p:cTn>
+                  </p:par>
+                  <p:par>
+                    <p:cTn id="23" fill="hold">
+                      <p:stCondLst>
+                        <p:cond delay="indefinite"/>
+                      </p:stCondLst>
+                      <p:childTnLst>
+                        <p:par>
+                          <p:cTn id="24" fill="hold">
+                            <p:stCondLst>
+                              <p:cond delay="0"/>
+                            </p:stCondLst>
+                            <p:childTnLst>
+                              <p:par>
+                                <p:cTn id="25" presetID="1" presetClass="entr" presetSubtype="0" fill="hold" grpId="0" nodeType="clickEffect">
+                                  <p:stCondLst>
+                                    <p:cond delay="0"/>
+                                  </p:stCondLst>
+                                  <p:childTnLst>
+                                    <p:set>
+                                      <p:cBhvr>
+                                        <p:cTn id="26" dur="1" fill="hold">
+                                          <p:stCondLst>
+                                            <p:cond delay="0"/>
+                                          </p:stCondLst>
+                                        </p:cTn>
+                                        <p:tgtEl>
+                                          <p:spTgt spid="12"/>
+                                        </p:tgtEl>
+                                        <p:attrNameLst>
+                                          <p:attrName>style.visibility</p:attrName>
+                                        </p:attrNameLst>
+                                      </p:cBhvr>
+                                      <p:to>
+                                        <p:strVal val="visible"/>
+                                      </p:to>
+                                    </p:set>
+                                  </p:childTnLst>
+                                </p:cTn>
+                              </p:par>
+                              <p:par>
+                                <p:cTn id="27" presetID="1" presetClass="entr" presetSubtype="0" fill="hold" nodeType="withEffect">
+                                  <p:stCondLst>
+                                    <p:cond delay="0"/>
+                                  </p:stCondLst>
+                                  <p:childTnLst>
+                                    <p:set>
+                                      <p:cBhvr>
+                                        <p:cTn id="28" dur="1" fill="hold">
                                           <p:stCondLst>
                                             <p:cond delay="0"/>
                                           </p:stCondLst>
@@ -7421,6 +7561,7 @@
       <p:bldP spid="6" grpId="0" animBg="1"/>
       <p:bldP spid="9" grpId="0" animBg="1"/>
       <p:bldP spid="12" grpId="0" animBg="1"/>
+      <p:bldP spid="13" grpId="0" animBg="1"/>
     </p:bldLst>
   </p:timing>
 </p:sld>
@@ -32233,14 +32374,12 @@
 </file>
 
 <file path=customXml/item1.xml><?xml version="1.0" encoding="utf-8"?>
-<p:properties xmlns:p="http://schemas.microsoft.com/office/2006/metadata/properties" xmlns:xsi="http://www.w3.org/2001/XMLSchema-instance" xmlns:pc="http://schemas.microsoft.com/office/infopath/2007/PartnerControls">
-  <documentManagement>
-    <DocumentType xmlns="B52DB2DB-4C79-421A-B3B5-7B3E39903FAF">Presentation</DocumentType>
-    <Tags xmlns="B52DB2DB-4C79-421A-B3B5-7B3E39903FAF"/>
-    <PublishingExpirationDate xmlns="http://schemas.microsoft.com/sharepoint/v3" xsi:nil="true"/>
-    <PublishingStartDate xmlns="http://schemas.microsoft.com/sharepoint/v3" xsi:nil="true"/>
-  </documentManagement>
-</p:properties>
+<?mso-contentType ?>
+<FormTemplates xmlns="http://schemas.microsoft.com/sharepoint/v3/contenttype/forms">
+  <Display>DocumentLibraryForm</Display>
+  <Edit>DocumentLibraryForm</Edit>
+  <New>DocumentLibraryForm</New>
+</FormTemplates>
 </file>
 
 <file path=customXml/item2.xml><?xml version="1.0" encoding="utf-8"?>
@@ -32426,27 +32565,20 @@
 </file>
 
 <file path=customXml/item3.xml><?xml version="1.0" encoding="utf-8"?>
-<?mso-contentType ?>
-<FormTemplates xmlns="http://schemas.microsoft.com/sharepoint/v3/contenttype/forms">
-  <Display>DocumentLibraryForm</Display>
-  <Edit>DocumentLibraryForm</Edit>
-  <New>DocumentLibraryForm</New>
-</FormTemplates>
+<p:properties xmlns:p="http://schemas.microsoft.com/office/2006/metadata/properties" xmlns:xsi="http://www.w3.org/2001/XMLSchema-instance" xmlns:pc="http://schemas.microsoft.com/office/infopath/2007/PartnerControls">
+  <documentManagement>
+    <DocumentType xmlns="B52DB2DB-4C79-421A-B3B5-7B3E39903FAF">Presentation</DocumentType>
+    <Tags xmlns="B52DB2DB-4C79-421A-B3B5-7B3E39903FAF"/>
+    <PublishingExpirationDate xmlns="http://schemas.microsoft.com/sharepoint/v3" xsi:nil="true"/>
+    <PublishingStartDate xmlns="http://schemas.microsoft.com/sharepoint/v3" xsi:nil="true"/>
+  </documentManagement>
+</p:properties>
 </file>
 
 <file path=customXml/itemProps1.xml><?xml version="1.0" encoding="utf-8"?>
-<ds:datastoreItem xmlns:ds="http://schemas.openxmlformats.org/officeDocument/2006/customXml" ds:itemID="{C37D435A-036C-4A6E-9A9D-B0F04F096E31}">
+<ds:datastoreItem xmlns:ds="http://schemas.openxmlformats.org/officeDocument/2006/customXml" ds:itemID="{9AE84C29-3D22-4B38-861A-92252ADDEB5A}">
   <ds:schemaRefs>
-    <ds:schemaRef ds:uri="http://purl.org/dc/terms/"/>
-    <ds:schemaRef ds:uri="http://purl.org/dc/dcmitype/"/>
-    <ds:schemaRef ds:uri="http://www.w3.org/XML/1998/namespace"/>
-    <ds:schemaRef ds:uri="http://schemas.microsoft.com/office/2006/metadata/properties"/>
-    <ds:schemaRef ds:uri="http://schemas.microsoft.com/office/2006/documentManagement/types"/>
-    <ds:schemaRef ds:uri="http://purl.org/dc/elements/1.1/"/>
-    <ds:schemaRef ds:uri="http://schemas.microsoft.com/office/infopath/2007/PartnerControls"/>
-    <ds:schemaRef ds:uri="http://schemas.openxmlformats.org/package/2006/metadata/core-properties"/>
-    <ds:schemaRef ds:uri="B52DB2DB-4C79-421A-B3B5-7B3E39903FAF"/>
-    <ds:schemaRef ds:uri="http://schemas.microsoft.com/sharepoint/v3"/>
+    <ds:schemaRef ds:uri="http://schemas.microsoft.com/sharepoint/v3/contenttype/forms"/>
   </ds:schemaRefs>
 </ds:datastoreItem>
 </file>
@@ -32471,9 +32603,18 @@
 </file>
 
 <file path=customXml/itemProps3.xml><?xml version="1.0" encoding="utf-8"?>
-<ds:datastoreItem xmlns:ds="http://schemas.openxmlformats.org/officeDocument/2006/customXml" ds:itemID="{9AE84C29-3D22-4B38-861A-92252ADDEB5A}">
+<ds:datastoreItem xmlns:ds="http://schemas.openxmlformats.org/officeDocument/2006/customXml" ds:itemID="{C37D435A-036C-4A6E-9A9D-B0F04F096E31}">
   <ds:schemaRefs>
-    <ds:schemaRef ds:uri="http://schemas.microsoft.com/sharepoint/v3/contenttype/forms"/>
+    <ds:schemaRef ds:uri="http://purl.org/dc/terms/"/>
+    <ds:schemaRef ds:uri="http://purl.org/dc/dcmitype/"/>
+    <ds:schemaRef ds:uri="http://www.w3.org/XML/1998/namespace"/>
+    <ds:schemaRef ds:uri="http://schemas.microsoft.com/office/2006/metadata/properties"/>
+    <ds:schemaRef ds:uri="http://schemas.microsoft.com/office/2006/documentManagement/types"/>
+    <ds:schemaRef ds:uri="http://purl.org/dc/elements/1.1/"/>
+    <ds:schemaRef ds:uri="http://schemas.microsoft.com/office/infopath/2007/PartnerControls"/>
+    <ds:schemaRef ds:uri="http://schemas.openxmlformats.org/package/2006/metadata/core-properties"/>
+    <ds:schemaRef ds:uri="B52DB2DB-4C79-421A-B3B5-7B3E39903FAF"/>
+    <ds:schemaRef ds:uri="http://schemas.microsoft.com/sharepoint/v3"/>
   </ds:schemaRefs>
 </ds:datastoreItem>
 </file>
</xml_diff>